<commit_message>
complete previous typo fix & knit to ppt
</commit_message>
<xml_diff>
--- a/sessions/4-read-data.pptx
+++ b/sessions/4-read-data.pptx
@@ -6567,11 +6567,11 @@
               <a:rPr sz="1800">
                 <a:latin typeface="Courier"/>
               </a:rPr>
-              <a:t>discharge</a:t>
-            </a:r>
-            <a:r>
-              <a:rPr/>
-              <a:t> vector from in </a:t>
+              <a:t>discharge_dttm</a:t>
+            </a:r>
+            <a:r>
+              <a:rPr/>
+              <a:t> vector from </a:t>
             </a:r>
             <a:r>
               <a:rPr sz="1800">
@@ -6847,7 +6847,7 @@
               <a:rPr sz="1800">
                 <a:latin typeface="Courier"/>
               </a:rPr>
-              <a:t>discharge</a:t>
+              <a:t>discharge_dttm</a:t>
             </a:r>
             <a:r>
               <a:rPr/>
@@ -6887,7 +6887,7 @@
               <a:rPr sz="1800">
                 <a:latin typeface="Courier"/>
               </a:rPr>
-              <a:t>discharge</a:t>
+              <a:t>discharge_dttm</a:t>
             </a:r>
           </a:p>
         </p:txBody>

</xml_diff>